<commit_message>
Update TODO.md to reflect v0.1.8 diagram improvements with connector anchoring, bounding box calculation, and grouping support
- Mark completed: connector anchoring to shapes with auto-routing (fixed shape IDs, stCxn/endCxn XML elements, horizontal/vertical flow connection sites), diagram bounding box calculation (DiagramBounds struct with automatic bounds from shape positions), diagram grouping support (grouped flag, helper methods from_shapes/from_shapes_and_connectors/empty)
- Add shape ID fiel
</commit_message>
<xml_diff>
--- a/examples/md2ppt_demo.pptx
+++ b/examples/md2ppt_demo.pptx
@@ -1525,7 +1525,7 @@
                   <a:srgbClr val="FFFFFF"/>
                 </a:solidFill>
               </a:rPr>
-              <a:t>USER</a:t>
+              <a:t>LINE_ITEM</a:t>
             </a:r>
           </a:p>
         </p:txBody>
@@ -1567,9 +1567,9 @@
                 </a:solidFill>
               </a:rPr>
               <a:t>int id PK
-string name
-string email
-date created_at</a:t>
+int order_id FK
+int product_id FK
+int quantity</a:t>
             </a:r>
           </a:p>
         </p:txBody>
@@ -1695,7 +1695,7 @@
                   <a:srgbClr val="FFFFFF"/>
                 </a:solidFill>
               </a:rPr>
-              <a:t>ntains</a:t>
+              <a:t>USER</a:t>
             </a:r>
           </a:p>
         </p:txBody>
@@ -1709,7 +1709,7 @@
         <p:spPr>
           <a:xfrm>
             <a:off x="500000" y="4500000"/>
-            <a:ext cx="2200000" cy="280000"/>
+            <a:ext cx="2200000" cy="1120000"/>
           </a:xfrm>
           <a:prstGeom prst="rect">
             <a:avLst/>
@@ -1736,7 +1736,10 @@
                   <a:srgbClr val="000000"/>
                 </a:solidFill>
               </a:rPr>
-              <a:t/>
+              <a:t>int id PK
+string name
+string email
+date created_at</a:t>
             </a:r>
           </a:p>
         </p:txBody>
@@ -1777,7 +1780,7 @@
                   <a:srgbClr val="FFFFFF"/>
                 </a:solidFill>
               </a:rPr>
-              <a:t>PRODUCT</a:t>
+              <a:t>ntains</a:t>
             </a:r>
           </a:p>
         </p:txBody>
@@ -1791,7 +1794,7 @@
         <p:spPr>
           <a:xfrm>
             <a:off x="3300000" y="4500000"/>
-            <a:ext cx="2200000" cy="1120000"/>
+            <a:ext cx="2200000" cy="280000"/>
           </a:xfrm>
           <a:prstGeom prst="rect">
             <a:avLst/>
@@ -1818,10 +1821,7 @@
                   <a:srgbClr val="000000"/>
                 </a:solidFill>
               </a:rPr>
-              <a:t>int id PK
-string name
-decimal price
-int stock</a:t>
+              <a:t/>
             </a:r>
           </a:p>
         </p:txBody>
@@ -1862,7 +1862,7 @@
                   <a:srgbClr val="FFFFFF"/>
                 </a:solidFill>
               </a:rPr>
-              <a:t>LINE_ITEM</a:t>
+              <a:t>PRODUCT</a:t>
             </a:r>
           </a:p>
         </p:txBody>
@@ -1904,9 +1904,9 @@
                 </a:solidFill>
               </a:rPr>
               <a:t>int id PK
-int order_id FK
-int product_id FK
-int quantity</a:t>
+string name
+decimal price
+int stock</a:t>
             </a:r>
           </a:p>
         </p:txBody>
@@ -1920,8 +1920,8 @@
         </p:nvCxnSpPr>
         <p:spPr>
           <a:xfrm flipH="1">
-            <a:off x="500000" y="1800000"/>
-            <a:ext cx="7800000" cy="2500000"/>
+            <a:off x="3300000" y="1800000"/>
+            <a:ext cx="5000000" cy="2500000"/>
           </a:xfrm>
           <a:prstGeom prst="bentConnector3">
             <a:avLst/>
@@ -1945,7 +1945,7 @@
         <p:spPr>
           <a:xfrm flipH="1" flipV="1">
             <a:off x="500000" y="1800000"/>
-            <a:ext cx="5000000" cy="2500000"/>
+            <a:ext cx="7800000" cy="2500000"/>
           </a:xfrm>
           <a:prstGeom prst="bentConnector3">
             <a:avLst/>
@@ -10386,7 +10386,7 @@
       </p:sp>
       <p:sp>
         <p:nvSpPr>
-          <p:cNvPr id="11" name="Shape 11"/>
+          <p:cNvPr id="10" name="Shape 10"/>
           <p:cNvSpPr/>
           <p:nvPr/>
         </p:nvSpPr>
@@ -10427,7 +10427,7 @@
       </p:sp>
       <p:sp>
         <p:nvSpPr>
-          <p:cNvPr id="12" name="Shape 12"/>
+          <p:cNvPr id="11" name="Shape 11"/>
           <p:cNvSpPr/>
           <p:nvPr/>
         </p:nvSpPr>
@@ -10509,7 +10509,7 @@
       </p:sp>
       <p:sp>
         <p:nvSpPr>
-          <p:cNvPr id="14" name="Shape 14"/>
+          <p:cNvPr id="12" name="Shape 12"/>
           <p:cNvSpPr/>
           <p:nvPr/>
         </p:nvSpPr>
@@ -10550,7 +10550,7 @@
       </p:sp>
       <p:sp>
         <p:nvSpPr>
-          <p:cNvPr id="15" name="Shape 15"/>
+          <p:cNvPr id="13" name="Shape 13"/>
           <p:cNvSpPr/>
           <p:nvPr/>
         </p:nvSpPr>
@@ -10591,7 +10591,7 @@
       </p:sp>
       <p:sp>
         <p:nvSpPr>
-          <p:cNvPr id="16" name="Shape 16"/>
+          <p:cNvPr id="14" name="Shape 14"/>
           <p:cNvSpPr/>
           <p:nvPr/>
         </p:nvSpPr>
@@ -10673,7 +10673,7 @@
       </p:sp>
       <p:sp>
         <p:nvSpPr>
-          <p:cNvPr id="18" name="Shape 18"/>
+          <p:cNvPr id="15" name="Shape 15"/>
           <p:cNvSpPr/>
           <p:nvPr/>
         </p:nvSpPr>
@@ -10714,7 +10714,7 @@
       </p:sp>
       <p:sp>
         <p:nvSpPr>
-          <p:cNvPr id="19" name="Shape 19"/>
+          <p:cNvPr id="16" name="Shape 16"/>
           <p:cNvSpPr/>
           <p:nvPr/>
         </p:nvSpPr>
@@ -10757,7 +10757,9 @@
         <p:nvCxnSpPr>
           <p:cNvPr id="60" name="Connector 60"/>
           <p:cNvCxnSpPr>
-</p:cNvCxnSpPr>
+            <a:stCxn id="10" idx="2"/>
+            <a:endCxn id="12" idx="0"/>
+          </p:cNvCxnSpPr>
           <p:nvPr/>
         </p:nvCxnSpPr>
         <p:spPr>
@@ -10781,7 +10783,9 @@
         <p:nvCxnSpPr>
           <p:cNvPr id="61" name="Connector 61"/>
           <p:cNvCxnSpPr>
-</p:cNvCxnSpPr>
+            <a:stCxn id="11" idx="2"/>
+            <a:endCxn id="12" idx="0"/>
+          </p:cNvCxnSpPr>
           <p:nvPr/>
         </p:nvCxnSpPr>
         <p:spPr>
@@ -10805,7 +10809,9 @@
         <p:nvCxnSpPr>
           <p:cNvPr id="62" name="Connector 62"/>
           <p:cNvCxnSpPr>
-</p:cNvCxnSpPr>
+            <a:stCxn id="12" idx="2"/>
+            <a:endCxn id="13" idx="0"/>
+          </p:cNvCxnSpPr>
           <p:nvPr/>
         </p:nvCxnSpPr>
         <p:spPr>
@@ -10829,7 +10835,9 @@
         <p:nvCxnSpPr>
           <p:cNvPr id="63" name="Connector 63"/>
           <p:cNvCxnSpPr>
-</p:cNvCxnSpPr>
+            <a:stCxn id="12" idx="2"/>
+            <a:endCxn id="14" idx="0"/>
+          </p:cNvCxnSpPr>
           <p:nvPr/>
         </p:nvCxnSpPr>
         <p:spPr>
@@ -10853,7 +10861,9 @@
         <p:nvCxnSpPr>
           <p:cNvPr id="64" name="Connector 64"/>
           <p:cNvCxnSpPr>
-</p:cNvCxnSpPr>
+            <a:stCxn id="13" idx="2"/>
+            <a:endCxn id="15" idx="0"/>
+          </p:cNvCxnSpPr>
           <p:nvPr/>
         </p:nvCxnSpPr>
         <p:spPr>
@@ -10877,7 +10887,9 @@
         <p:nvCxnSpPr>
           <p:cNvPr id="65" name="Connector 65"/>
           <p:cNvCxnSpPr>
-</p:cNvCxnSpPr>
+            <a:stCxn id="14" idx="2"/>
+            <a:endCxn id="15" idx="0"/>
+          </p:cNvCxnSpPr>
           <p:nvPr/>
         </p:nvCxnSpPr>
         <p:spPr>
@@ -10901,7 +10913,9 @@
         <p:nvCxnSpPr>
           <p:cNvPr id="66" name="Connector 66"/>
           <p:cNvCxnSpPr>
-</p:cNvCxnSpPr>
+            <a:stCxn id="14" idx="2"/>
+            <a:endCxn id="16" idx="0"/>
+          </p:cNvCxnSpPr>
           <p:nvPr/>
         </p:nvCxnSpPr>
         <p:spPr>

</xml_diff>